<commit_message>
Completed status for this wk -- issues with our sloc counter.
</commit_message>
<xml_diff>
--- a/doc/tunnelk Status - 2012-04-12.pptx
+++ b/doc/tunnelk Status - 2012-04-12.pptx
@@ -5,10 +5,10 @@
     <p:sldMasterId id="2147483648" r:id="rId1"/>
   </p:sldMasterIdLst>
   <p:notesMasterIdLst>
-    <p:notesMasterId r:id="rId16"/>
+    <p:notesMasterId r:id="rId17"/>
   </p:notesMasterIdLst>
   <p:handoutMasterIdLst>
-    <p:handoutMasterId r:id="rId17"/>
+    <p:handoutMasterId r:id="rId18"/>
   </p:handoutMasterIdLst>
   <p:sldIdLst>
     <p:sldId id="256" r:id="rId2"/>
@@ -19,12 +19,13 @@
     <p:sldId id="270" r:id="rId7"/>
     <p:sldId id="272" r:id="rId8"/>
     <p:sldId id="273" r:id="rId9"/>
-    <p:sldId id="274" r:id="rId10"/>
-    <p:sldId id="264" r:id="rId11"/>
-    <p:sldId id="263" r:id="rId12"/>
-    <p:sldId id="265" r:id="rId13"/>
-    <p:sldId id="269" r:id="rId14"/>
-    <p:sldId id="266" r:id="rId15"/>
+    <p:sldId id="276" r:id="rId10"/>
+    <p:sldId id="274" r:id="rId11"/>
+    <p:sldId id="264" r:id="rId12"/>
+    <p:sldId id="263" r:id="rId13"/>
+    <p:sldId id="265" r:id="rId14"/>
+    <p:sldId id="275" r:id="rId15"/>
+    <p:sldId id="266" r:id="rId16"/>
   </p:sldIdLst>
   <p:sldSz cx="9144000" cy="6858000" type="screen4x3"/>
   <p:notesSz cx="6858000" cy="9144000"/>
@@ -171,10 +172,10 @@
           </c:marker>
           <c:cat>
             <c:numRef>
-              <c:f>Sheet1!$B$1:$L$1</c:f>
+              <c:f>Sheet1!$B$1:$M$1</c:f>
               <c:numCache>
-                <c:formatCode>m/d/yyyy</c:formatCode>
-                <c:ptCount val="11"/>
+                <c:formatCode>m/d/yy</c:formatCode>
+                <c:ptCount val="12"/>
                 <c:pt idx="0">
                   <c:v>40927.0</c:v>
                 </c:pt>
@@ -207,16 +208,19 @@
                 </c:pt>
                 <c:pt idx="10">
                   <c:v>41004.0</c:v>
+                </c:pt>
+                <c:pt idx="11">
+                  <c:v>41011.0</c:v>
                 </c:pt>
               </c:numCache>
             </c:numRef>
           </c:cat>
           <c:val>
             <c:numRef>
-              <c:f>Sheet1!$B$2:$L$2</c:f>
+              <c:f>Sheet1!$B$2:$M$2</c:f>
               <c:numCache>
                 <c:formatCode>General</c:formatCode>
-                <c:ptCount val="11"/>
+                <c:ptCount val="12"/>
                 <c:pt idx="0">
                   <c:v>5.0</c:v>
                 </c:pt>
@@ -248,6 +252,9 @@
                   <c:v>116.0</c:v>
                 </c:pt>
                 <c:pt idx="10">
+                  <c:v>116.0</c:v>
+                </c:pt>
+                <c:pt idx="11">
                   <c:v>116.0</c:v>
                 </c:pt>
               </c:numCache>
@@ -274,10 +281,10 @@
           </c:marker>
           <c:cat>
             <c:numRef>
-              <c:f>Sheet1!$B$1:$L$1</c:f>
+              <c:f>Sheet1!$B$1:$M$1</c:f>
               <c:numCache>
-                <c:formatCode>m/d/yyyy</c:formatCode>
-                <c:ptCount val="11"/>
+                <c:formatCode>m/d/yy</c:formatCode>
+                <c:ptCount val="12"/>
                 <c:pt idx="0">
                   <c:v>40927.0</c:v>
                 </c:pt>
@@ -310,16 +317,19 @@
                 </c:pt>
                 <c:pt idx="10">
                   <c:v>41004.0</c:v>
+                </c:pt>
+                <c:pt idx="11">
+                  <c:v>41011.0</c:v>
                 </c:pt>
               </c:numCache>
             </c:numRef>
           </c:cat>
           <c:val>
             <c:numRef>
-              <c:f>Sheet1!$B$3:$L$3</c:f>
+              <c:f>Sheet1!$B$3:$M$3</c:f>
               <c:numCache>
                 <c:formatCode>General</c:formatCode>
-                <c:ptCount val="11"/>
+                <c:ptCount val="12"/>
                 <c:pt idx="0">
                   <c:v>0.0</c:v>
                 </c:pt>
@@ -351,6 +361,9 @@
                   <c:v>0.0</c:v>
                 </c:pt>
                 <c:pt idx="10">
+                  <c:v>0.0</c:v>
+                </c:pt>
+                <c:pt idx="11">
                   <c:v>0.0</c:v>
                 </c:pt>
               </c:numCache>
@@ -377,10 +390,10 @@
           </c:marker>
           <c:cat>
             <c:numRef>
-              <c:f>Sheet1!$B$1:$L$1</c:f>
+              <c:f>Sheet1!$B$1:$M$1</c:f>
               <c:numCache>
-                <c:formatCode>m/d/yyyy</c:formatCode>
-                <c:ptCount val="11"/>
+                <c:formatCode>m/d/yy</c:formatCode>
+                <c:ptCount val="12"/>
                 <c:pt idx="0">
                   <c:v>40927.0</c:v>
                 </c:pt>
@@ -413,16 +426,19 @@
                 </c:pt>
                 <c:pt idx="10">
                   <c:v>41004.0</c:v>
+                </c:pt>
+                <c:pt idx="11">
+                  <c:v>41011.0</c:v>
                 </c:pt>
               </c:numCache>
             </c:numRef>
           </c:cat>
           <c:val>
             <c:numRef>
-              <c:f>Sheet1!$B$4:$L$4</c:f>
+              <c:f>Sheet1!$B$4:$M$4</c:f>
               <c:numCache>
                 <c:formatCode>General</c:formatCode>
-                <c:ptCount val="11"/>
+                <c:ptCount val="12"/>
                 <c:pt idx="0">
                   <c:v>47.0</c:v>
                 </c:pt>
@@ -454,6 +470,9 @@
                   <c:v>158.0</c:v>
                 </c:pt>
                 <c:pt idx="10">
+                  <c:v>158.0</c:v>
+                </c:pt>
+                <c:pt idx="11">
                   <c:v>158.0</c:v>
                 </c:pt>
               </c:numCache>
@@ -480,10 +499,10 @@
           </c:marker>
           <c:cat>
             <c:numRef>
-              <c:f>Sheet1!$B$1:$L$1</c:f>
+              <c:f>Sheet1!$B$1:$M$1</c:f>
               <c:numCache>
-                <c:formatCode>m/d/yyyy</c:formatCode>
-                <c:ptCount val="11"/>
+                <c:formatCode>m/d/yy</c:formatCode>
+                <c:ptCount val="12"/>
                 <c:pt idx="0">
                   <c:v>40927.0</c:v>
                 </c:pt>
@@ -516,16 +535,19 @@
                 </c:pt>
                 <c:pt idx="10">
                   <c:v>41004.0</c:v>
+                </c:pt>
+                <c:pt idx="11">
+                  <c:v>41011.0</c:v>
                 </c:pt>
               </c:numCache>
             </c:numRef>
           </c:cat>
           <c:val>
             <c:numRef>
-              <c:f>Sheet1!$B$5:$L$5</c:f>
+              <c:f>Sheet1!$B$5:$M$5</c:f>
               <c:numCache>
                 <c:formatCode>General</c:formatCode>
-                <c:ptCount val="11"/>
+                <c:ptCount val="12"/>
                 <c:pt idx="0">
                   <c:v>70.0</c:v>
                 </c:pt>
@@ -558,6 +580,9 @@
                 </c:pt>
                 <c:pt idx="10">
                   <c:v>134.0</c:v>
+                </c:pt>
+                <c:pt idx="11">
+                  <c:v>149.0</c:v>
                 </c:pt>
               </c:numCache>
             </c:numRef>
@@ -574,21 +599,21 @@
         </c:dLbls>
         <c:marker val="1"/>
         <c:smooth val="0"/>
-        <c:axId val="498637800"/>
-        <c:axId val="498641000"/>
+        <c:axId val="667307496"/>
+        <c:axId val="667668088"/>
       </c:lineChart>
       <c:dateAx>
-        <c:axId val="498637800"/>
+        <c:axId val="667307496"/>
         <c:scaling>
           <c:orientation val="minMax"/>
         </c:scaling>
         <c:delete val="0"/>
         <c:axPos val="b"/>
-        <c:numFmt formatCode="m/d/yyyy" sourceLinked="1"/>
+        <c:numFmt formatCode="m/d/yy" sourceLinked="1"/>
         <c:majorTickMark val="out"/>
         <c:minorTickMark val="none"/>
         <c:tickLblPos val="nextTo"/>
-        <c:crossAx val="498641000"/>
+        <c:crossAx val="667668088"/>
         <c:crosses val="autoZero"/>
         <c:auto val="1"/>
         <c:lblOffset val="100"/>
@@ -597,7 +622,7 @@
         <c:majorTimeUnit val="days"/>
       </c:dateAx>
       <c:valAx>
-        <c:axId val="498641000"/>
+        <c:axId val="667668088"/>
         <c:scaling>
           <c:orientation val="minMax"/>
         </c:scaling>
@@ -608,7 +633,7 @@
         <c:majorTickMark val="out"/>
         <c:minorTickMark val="none"/>
         <c:tickLblPos val="nextTo"/>
-        <c:crossAx val="498637800"/>
+        <c:crossAx val="667307496"/>
         <c:crosses val="autoZero"/>
         <c:crossBetween val="between"/>
       </c:valAx>
@@ -651,6 +676,10 @@
     </mc:Fallback>
   </mc:AlternateContent>
   <c:chart>
+    <c:title>
+      <c:layout/>
+      <c:overlay val="0"/>
+    </c:title>
     <c:autoTitleDeleted val="0"/>
     <c:plotArea>
       <c:layout/>
@@ -658,15 +687,15 @@
         <c:grouping val="standard"/>
         <c:varyColors val="0"/>
         <c:ser>
-          <c:idx val="0"/>
+          <c:idx val="1"/>
           <c:order val="0"/>
           <c:tx>
             <c:strRef>
-              <c:f>Sheet1!$A$8</c:f>
+              <c:f>Sheet1!$A$11</c:f>
               <c:strCache>
                 <c:ptCount val="1"/>
                 <c:pt idx="0">
-                  <c:v>SLOC (Physical)</c:v>
+                  <c:v># of Source Files</c:v>
                 </c:pt>
               </c:strCache>
             </c:strRef>
@@ -676,10 +705,10 @@
           </c:marker>
           <c:cat>
             <c:numRef>
-              <c:f>Sheet1!$B$7:$L$7</c:f>
+              <c:f>Sheet1!$B$7:$M$7</c:f>
               <c:numCache>
-                <c:formatCode>m/d/yyyy</c:formatCode>
-                <c:ptCount val="11"/>
+                <c:formatCode>m/d/yy</c:formatCode>
+                <c:ptCount val="12"/>
                 <c:pt idx="0">
                   <c:v>40927.0</c:v>
                 </c:pt>
@@ -712,139 +741,54 @@
                 </c:pt>
                 <c:pt idx="10">
                   <c:v>41004.0</c:v>
+                </c:pt>
+                <c:pt idx="11">
+                  <c:v>41011.0</c:v>
                 </c:pt>
               </c:numCache>
             </c:numRef>
           </c:cat>
           <c:val>
             <c:numRef>
-              <c:f>Sheet1!$B$8:$L$8</c:f>
+              <c:f>Sheet1!$B$11:$M$11</c:f>
               <c:numCache>
                 <c:formatCode>General</c:formatCode>
-                <c:ptCount val="11"/>
+                <c:ptCount val="12"/>
+                <c:pt idx="0">
+                  <c:v>85.0</c:v>
+                </c:pt>
+                <c:pt idx="1">
+                  <c:v>85.0</c:v>
+                </c:pt>
                 <c:pt idx="2">
-                  <c:v>8825.0</c:v>
+                  <c:v>96.0</c:v>
                 </c:pt>
                 <c:pt idx="3">
-                  <c:v>9092.0</c:v>
+                  <c:v>97.0</c:v>
                 </c:pt>
                 <c:pt idx="4">
-                  <c:v>9574.0</c:v>
+                  <c:v>107.0</c:v>
                 </c:pt>
                 <c:pt idx="5">
-                  <c:v>9574.0</c:v>
+                  <c:v>112.0</c:v>
                 </c:pt>
                 <c:pt idx="6">
-                  <c:v>9574.0</c:v>
+                  <c:v>112.0</c:v>
                 </c:pt>
                 <c:pt idx="7">
-                  <c:v>9574.0</c:v>
+                  <c:v>112.0</c:v>
                 </c:pt>
                 <c:pt idx="8">
-                  <c:v>9284.0</c:v>
+                  <c:v>116.0</c:v>
                 </c:pt>
                 <c:pt idx="9">
-                  <c:v>9203.0</c:v>
+                  <c:v>114.0</c:v>
                 </c:pt>
                 <c:pt idx="10">
-                  <c:v>9325.0</c:v>
-                </c:pt>
-              </c:numCache>
-            </c:numRef>
-          </c:val>
-          <c:smooth val="0"/>
-        </c:ser>
-        <c:ser>
-          <c:idx val="1"/>
-          <c:order val="1"/>
-          <c:tx>
-            <c:strRef>
-              <c:f>Sheet1!$A$9</c:f>
-              <c:strCache>
-                <c:ptCount val="1"/>
-                <c:pt idx="0">
-                  <c:v>SLOC (Logical)</c:v>
-                </c:pt>
-              </c:strCache>
-            </c:strRef>
-          </c:tx>
-          <c:marker>
-            <c:symbol val="none"/>
-          </c:marker>
-          <c:cat>
-            <c:numRef>
-              <c:f>Sheet1!$B$7:$L$7</c:f>
-              <c:numCache>
-                <c:formatCode>m/d/yyyy</c:formatCode>
-                <c:ptCount val="11"/>
-                <c:pt idx="0">
-                  <c:v>40927.0</c:v>
-                </c:pt>
-                <c:pt idx="1">
-                  <c:v>40934.0</c:v>
-                </c:pt>
-                <c:pt idx="2">
-                  <c:v>40941.0</c:v>
-                </c:pt>
-                <c:pt idx="3">
-                  <c:v>40948.0</c:v>
-                </c:pt>
-                <c:pt idx="4">
-                  <c:v>40955.0</c:v>
-                </c:pt>
-                <c:pt idx="5">
-                  <c:v>40962.0</c:v>
-                </c:pt>
-                <c:pt idx="6">
-                  <c:v>40969.0</c:v>
-                </c:pt>
-                <c:pt idx="7">
-                  <c:v>40976.0</c:v>
-                </c:pt>
-                <c:pt idx="8">
-                  <c:v>40983.0</c:v>
-                </c:pt>
-                <c:pt idx="9">
-                  <c:v>40997.0</c:v>
-                </c:pt>
-                <c:pt idx="10">
-                  <c:v>41004.0</c:v>
-                </c:pt>
-              </c:numCache>
-            </c:numRef>
-          </c:cat>
-          <c:val>
-            <c:numRef>
-              <c:f>Sheet1!$B$9:$L$9</c:f>
-              <c:numCache>
-                <c:formatCode>General</c:formatCode>
-                <c:ptCount val="11"/>
-                <c:pt idx="2">
-                  <c:v>6499.0</c:v>
-                </c:pt>
-                <c:pt idx="3">
-                  <c:v>6693.0</c:v>
-                </c:pt>
-                <c:pt idx="4">
-                  <c:v>7025.0</c:v>
-                </c:pt>
-                <c:pt idx="5">
-                  <c:v>7025.0</c:v>
-                </c:pt>
-                <c:pt idx="6">
-                  <c:v>7025.0</c:v>
-                </c:pt>
-                <c:pt idx="7">
-                  <c:v>7025.0</c:v>
-                </c:pt>
-                <c:pt idx="8">
-                  <c:v>7143.0</c:v>
-                </c:pt>
-                <c:pt idx="9">
-                  <c:v>8073.0</c:v>
-                </c:pt>
-                <c:pt idx="10">
-                  <c:v>8158.0</c:v>
+                  <c:v>114.0</c:v>
+                </c:pt>
+                <c:pt idx="11">
+                  <c:v>131.0</c:v>
                 </c:pt>
               </c:numCache>
             </c:numRef>
@@ -861,31 +805,21 @@
         </c:dLbls>
         <c:marker val="1"/>
         <c:smooth val="0"/>
-        <c:axId val="498742216"/>
-        <c:axId val="498745304"/>
+        <c:axId val="678755512"/>
+        <c:axId val="678758584"/>
       </c:lineChart>
       <c:dateAx>
-        <c:axId val="498742216"/>
+        <c:axId val="678755512"/>
         <c:scaling>
           <c:orientation val="minMax"/>
         </c:scaling>
         <c:delete val="0"/>
         <c:axPos val="b"/>
-        <c:numFmt formatCode="m/d/yyyy" sourceLinked="1"/>
+        <c:numFmt formatCode="m/d/yy" sourceLinked="1"/>
         <c:majorTickMark val="out"/>
         <c:minorTickMark val="none"/>
         <c:tickLblPos val="nextTo"/>
-        <c:txPr>
-          <a:bodyPr rot="-5400000" vert="horz"/>
-          <a:lstStyle/>
-          <a:p>
-            <a:pPr>
-              <a:defRPr/>
-            </a:pPr>
-            <a:endParaRPr lang="en-US"/>
-          </a:p>
-        </c:txPr>
-        <c:crossAx val="498745304"/>
+        <c:crossAx val="678758584"/>
         <c:crosses val="autoZero"/>
         <c:auto val="1"/>
         <c:lblOffset val="100"/>
@@ -894,9 +828,10 @@
         <c:majorTimeUnit val="days"/>
       </c:dateAx>
       <c:valAx>
-        <c:axId val="498745304"/>
+        <c:axId val="678758584"/>
         <c:scaling>
           <c:orientation val="minMax"/>
+          <c:min val="80.0"/>
         </c:scaling>
         <c:delete val="0"/>
         <c:axPos val="l"/>
@@ -905,7 +840,7 @@
         <c:majorTickMark val="out"/>
         <c:minorTickMark val="none"/>
         <c:tickLblPos val="nextTo"/>
-        <c:crossAx val="498742216"/>
+        <c:crossAx val="678755512"/>
         <c:crosses val="autoZero"/>
         <c:crossBetween val="between"/>
       </c:valAx>
@@ -939,10 +874,6 @@
     </mc:Fallback>
   </mc:AlternateContent>
   <c:chart>
-    <c:title>
-      <c:layout/>
-      <c:overlay val="0"/>
-    </c:title>
     <c:autoTitleDeleted val="0"/>
     <c:plotArea>
       <c:layout/>
@@ -950,15 +881,15 @@
         <c:grouping val="standard"/>
         <c:varyColors val="0"/>
         <c:ser>
-          <c:idx val="1"/>
+          <c:idx val="0"/>
           <c:order val="0"/>
           <c:tx>
             <c:strRef>
-              <c:f>Sheet1!$A$11</c:f>
+              <c:f>Sheet1!$A$8</c:f>
               <c:strCache>
                 <c:ptCount val="1"/>
                 <c:pt idx="0">
-                  <c:v># of Source Files</c:v>
+                  <c:v>SLOC (Physical)</c:v>
                 </c:pt>
               </c:strCache>
             </c:strRef>
@@ -968,10 +899,10 @@
           </c:marker>
           <c:cat>
             <c:numRef>
-              <c:f>Sheet1!$B$7:$L$7</c:f>
+              <c:f>Sheet1!$B$7:$M$7</c:f>
               <c:numCache>
-                <c:formatCode>m/d/yyyy</c:formatCode>
-                <c:ptCount val="11"/>
+                <c:formatCode>m/d/yy</c:formatCode>
+                <c:ptCount val="12"/>
                 <c:pt idx="0">
                   <c:v>40927.0</c:v>
                 </c:pt>
@@ -1004,48 +935,151 @@
                 </c:pt>
                 <c:pt idx="10">
                   <c:v>41004.0</c:v>
+                </c:pt>
+                <c:pt idx="11">
+                  <c:v>41011.0</c:v>
                 </c:pt>
               </c:numCache>
             </c:numRef>
           </c:cat>
           <c:val>
             <c:numRef>
-              <c:f>Sheet1!$B$11:$L$11</c:f>
+              <c:f>Sheet1!$B$8:$M$8</c:f>
               <c:numCache>
                 <c:formatCode>General</c:formatCode>
-                <c:ptCount val="11"/>
+                <c:ptCount val="12"/>
+                <c:pt idx="2">
+                  <c:v>8825.0</c:v>
+                </c:pt>
+                <c:pt idx="3">
+                  <c:v>9092.0</c:v>
+                </c:pt>
+                <c:pt idx="4">
+                  <c:v>9574.0</c:v>
+                </c:pt>
+                <c:pt idx="5">
+                  <c:v>9574.0</c:v>
+                </c:pt>
+                <c:pt idx="6">
+                  <c:v>9574.0</c:v>
+                </c:pt>
+                <c:pt idx="7">
+                  <c:v>9574.0</c:v>
+                </c:pt>
+                <c:pt idx="8">
+                  <c:v>9284.0</c:v>
+                </c:pt>
+                <c:pt idx="9">
+                  <c:v>9203.0</c:v>
+                </c:pt>
+                <c:pt idx="10">
+                  <c:v>9325.0</c:v>
+                </c:pt>
+                <c:pt idx="11">
+                  <c:v>9325.0</c:v>
+                </c:pt>
+              </c:numCache>
+            </c:numRef>
+          </c:val>
+          <c:smooth val="0"/>
+        </c:ser>
+        <c:ser>
+          <c:idx val="1"/>
+          <c:order val="1"/>
+          <c:tx>
+            <c:strRef>
+              <c:f>Sheet1!$A$9</c:f>
+              <c:strCache>
+                <c:ptCount val="1"/>
                 <c:pt idx="0">
-                  <c:v>85.0</c:v>
+                  <c:v>SLOC (Logical)</c:v>
+                </c:pt>
+              </c:strCache>
+            </c:strRef>
+          </c:tx>
+          <c:marker>
+            <c:symbol val="none"/>
+          </c:marker>
+          <c:cat>
+            <c:numRef>
+              <c:f>Sheet1!$B$7:$M$7</c:f>
+              <c:numCache>
+                <c:formatCode>m/d/yy</c:formatCode>
+                <c:ptCount val="12"/>
+                <c:pt idx="0">
+                  <c:v>40927.0</c:v>
                 </c:pt>
                 <c:pt idx="1">
-                  <c:v>85.0</c:v>
+                  <c:v>40934.0</c:v>
                 </c:pt>
                 <c:pt idx="2">
-                  <c:v>96.0</c:v>
+                  <c:v>40941.0</c:v>
                 </c:pt>
                 <c:pt idx="3">
-                  <c:v>97.0</c:v>
+                  <c:v>40948.0</c:v>
                 </c:pt>
                 <c:pt idx="4">
-                  <c:v>107.0</c:v>
+                  <c:v>40955.0</c:v>
                 </c:pt>
                 <c:pt idx="5">
-                  <c:v>112.0</c:v>
+                  <c:v>40962.0</c:v>
                 </c:pt>
                 <c:pt idx="6">
-                  <c:v>112.0</c:v>
+                  <c:v>40969.0</c:v>
                 </c:pt>
                 <c:pt idx="7">
-                  <c:v>112.0</c:v>
+                  <c:v>40976.0</c:v>
                 </c:pt>
                 <c:pt idx="8">
-                  <c:v>116.0</c:v>
+                  <c:v>40983.0</c:v>
                 </c:pt>
                 <c:pt idx="9">
-                  <c:v>114.0</c:v>
+                  <c:v>40997.0</c:v>
                 </c:pt>
                 <c:pt idx="10">
-                  <c:v>114.0</c:v>
+                  <c:v>41004.0</c:v>
+                </c:pt>
+                <c:pt idx="11">
+                  <c:v>41011.0</c:v>
+                </c:pt>
+              </c:numCache>
+            </c:numRef>
+          </c:cat>
+          <c:val>
+            <c:numRef>
+              <c:f>Sheet1!$B$9:$M$9</c:f>
+              <c:numCache>
+                <c:formatCode>General</c:formatCode>
+                <c:ptCount val="12"/>
+                <c:pt idx="2">
+                  <c:v>6499.0</c:v>
+                </c:pt>
+                <c:pt idx="3">
+                  <c:v>6693.0</c:v>
+                </c:pt>
+                <c:pt idx="4">
+                  <c:v>7025.0</c:v>
+                </c:pt>
+                <c:pt idx="5">
+                  <c:v>7025.0</c:v>
+                </c:pt>
+                <c:pt idx="6">
+                  <c:v>7025.0</c:v>
+                </c:pt>
+                <c:pt idx="7">
+                  <c:v>7025.0</c:v>
+                </c:pt>
+                <c:pt idx="8">
+                  <c:v>7143.0</c:v>
+                </c:pt>
+                <c:pt idx="9">
+                  <c:v>8073.0</c:v>
+                </c:pt>
+                <c:pt idx="10">
+                  <c:v>8158.0</c:v>
+                </c:pt>
+                <c:pt idx="11">
+                  <c:v>8158.0</c:v>
                 </c:pt>
               </c:numCache>
             </c:numRef>
@@ -1062,21 +1096,31 @@
         </c:dLbls>
         <c:marker val="1"/>
         <c:smooth val="0"/>
-        <c:axId val="498764088"/>
-        <c:axId val="498767160"/>
+        <c:axId val="667704824"/>
+        <c:axId val="106086472"/>
       </c:lineChart>
       <c:dateAx>
-        <c:axId val="498764088"/>
+        <c:axId val="667704824"/>
         <c:scaling>
           <c:orientation val="minMax"/>
         </c:scaling>
         <c:delete val="0"/>
         <c:axPos val="b"/>
-        <c:numFmt formatCode="m/d/yyyy" sourceLinked="1"/>
+        <c:numFmt formatCode="m/d/yy" sourceLinked="1"/>
         <c:majorTickMark val="out"/>
         <c:minorTickMark val="none"/>
         <c:tickLblPos val="nextTo"/>
-        <c:crossAx val="498767160"/>
+        <c:txPr>
+          <a:bodyPr rot="-2700000"/>
+          <a:lstStyle/>
+          <a:p>
+            <a:pPr>
+              <a:defRPr/>
+            </a:pPr>
+            <a:endParaRPr lang="en-US"/>
+          </a:p>
+        </c:txPr>
+        <c:crossAx val="106086472"/>
         <c:crosses val="autoZero"/>
         <c:auto val="1"/>
         <c:lblOffset val="100"/>
@@ -1085,10 +1129,10 @@
         <c:majorTimeUnit val="days"/>
       </c:dateAx>
       <c:valAx>
-        <c:axId val="498767160"/>
+        <c:axId val="106086472"/>
         <c:scaling>
           <c:orientation val="minMax"/>
-          <c:min val="80.0"/>
+          <c:min val="6000.0"/>
         </c:scaling>
         <c:delete val="0"/>
         <c:axPos val="l"/>
@@ -1097,7 +1141,7 @@
         <c:majorTickMark val="out"/>
         <c:minorTickMark val="none"/>
         <c:tickLblPos val="nextTo"/>
-        <c:crossAx val="498764088"/>
+        <c:crossAx val="667704824"/>
         <c:crosses val="autoZero"/>
         <c:crossBetween val="between"/>
       </c:valAx>
@@ -1156,10 +1200,10 @@
           </c:marker>
           <c:cat>
             <c:numRef>
-              <c:f>Sheet1!$B$13:$L$13</c:f>
+              <c:f>Sheet1!$B$13:$M$13</c:f>
               <c:numCache>
-                <c:formatCode>m/d/yyyy</c:formatCode>
-                <c:ptCount val="11"/>
+                <c:formatCode>m/d/yy</c:formatCode>
+                <c:ptCount val="12"/>
                 <c:pt idx="0">
                   <c:v>40927.0</c:v>
                 </c:pt>
@@ -1192,16 +1236,19 @@
                 </c:pt>
                 <c:pt idx="10">
                   <c:v>41004.0</c:v>
+                </c:pt>
+                <c:pt idx="11">
+                  <c:v>41011.0</c:v>
                 </c:pt>
               </c:numCache>
             </c:numRef>
           </c:cat>
           <c:val>
             <c:numRef>
-              <c:f>Sheet1!$B$14:$L$14</c:f>
+              <c:f>Sheet1!$B$14:$M$14</c:f>
               <c:numCache>
                 <c:formatCode>General</c:formatCode>
-                <c:ptCount val="11"/>
+                <c:ptCount val="12"/>
                 <c:pt idx="0">
                   <c:v>3.0</c:v>
                 </c:pt>
@@ -1233,6 +1280,9 @@
                   <c:v>3.0</c:v>
                 </c:pt>
                 <c:pt idx="10">
+                  <c:v>3.0</c:v>
+                </c:pt>
+                <c:pt idx="11">
                   <c:v>3.0</c:v>
                 </c:pt>
               </c:numCache>
@@ -1259,10 +1309,10 @@
           </c:marker>
           <c:cat>
             <c:numRef>
-              <c:f>Sheet1!$B$13:$L$13</c:f>
+              <c:f>Sheet1!$B$13:$M$13</c:f>
               <c:numCache>
-                <c:formatCode>m/d/yyyy</c:formatCode>
-                <c:ptCount val="11"/>
+                <c:formatCode>m/d/yy</c:formatCode>
+                <c:ptCount val="12"/>
                 <c:pt idx="0">
                   <c:v>40927.0</c:v>
                 </c:pt>
@@ -1295,16 +1345,19 @@
                 </c:pt>
                 <c:pt idx="10">
                   <c:v>41004.0</c:v>
+                </c:pt>
+                <c:pt idx="11">
+                  <c:v>41011.0</c:v>
                 </c:pt>
               </c:numCache>
             </c:numRef>
           </c:cat>
           <c:val>
             <c:numRef>
-              <c:f>Sheet1!$B$15:$L$15</c:f>
+              <c:f>Sheet1!$B$15:$M$15</c:f>
               <c:numCache>
                 <c:formatCode>General</c:formatCode>
-                <c:ptCount val="11"/>
+                <c:ptCount val="12"/>
                 <c:pt idx="0">
                   <c:v>0.0</c:v>
                 </c:pt>
@@ -1336,6 +1389,9 @@
                   <c:v>2.0</c:v>
                 </c:pt>
                 <c:pt idx="10">
+                  <c:v>2.0</c:v>
+                </c:pt>
+                <c:pt idx="11">
                   <c:v>2.0</c:v>
                 </c:pt>
               </c:numCache>
@@ -1362,10 +1418,10 @@
           </c:marker>
           <c:cat>
             <c:numRef>
-              <c:f>Sheet1!$B$13:$L$13</c:f>
+              <c:f>Sheet1!$B$13:$M$13</c:f>
               <c:numCache>
-                <c:formatCode>m/d/yyyy</c:formatCode>
-                <c:ptCount val="11"/>
+                <c:formatCode>m/d/yy</c:formatCode>
+                <c:ptCount val="12"/>
                 <c:pt idx="0">
                   <c:v>40927.0</c:v>
                 </c:pt>
@@ -1398,16 +1454,19 @@
                 </c:pt>
                 <c:pt idx="10">
                   <c:v>41004.0</c:v>
+                </c:pt>
+                <c:pt idx="11">
+                  <c:v>41011.0</c:v>
                 </c:pt>
               </c:numCache>
             </c:numRef>
           </c:cat>
           <c:val>
             <c:numRef>
-              <c:f>Sheet1!$B$16:$L$16</c:f>
+              <c:f>Sheet1!$B$16:$M$16</c:f>
               <c:numCache>
                 <c:formatCode>General</c:formatCode>
-                <c:ptCount val="11"/>
+                <c:ptCount val="12"/>
                 <c:pt idx="0">
                   <c:v>0.0</c:v>
                 </c:pt>
@@ -1439,7 +1498,10 @@
                   <c:v>2.0</c:v>
                 </c:pt>
                 <c:pt idx="10">
-                  <c:v>3.0</c:v>
+                  <c:v>2.0</c:v>
+                </c:pt>
+                <c:pt idx="11">
+                  <c:v>2.0</c:v>
                 </c:pt>
               </c:numCache>
             </c:numRef>
@@ -1465,10 +1527,10 @@
           </c:marker>
           <c:cat>
             <c:numRef>
-              <c:f>Sheet1!$B$13:$L$13</c:f>
+              <c:f>Sheet1!$B$13:$M$13</c:f>
               <c:numCache>
-                <c:formatCode>m/d/yyyy</c:formatCode>
-                <c:ptCount val="11"/>
+                <c:formatCode>m/d/yy</c:formatCode>
+                <c:ptCount val="12"/>
                 <c:pt idx="0">
                   <c:v>40927.0</c:v>
                 </c:pt>
@@ -1501,16 +1563,19 @@
                 </c:pt>
                 <c:pt idx="10">
                   <c:v>41004.0</c:v>
+                </c:pt>
+                <c:pt idx="11">
+                  <c:v>41011.0</c:v>
                 </c:pt>
               </c:numCache>
             </c:numRef>
           </c:cat>
           <c:val>
             <c:numRef>
-              <c:f>Sheet1!$B$17:$L$17</c:f>
+              <c:f>Sheet1!$B$17:$M$17</c:f>
               <c:numCache>
                 <c:formatCode>General</c:formatCode>
-                <c:ptCount val="11"/>
+                <c:ptCount val="12"/>
                 <c:pt idx="0">
                   <c:v>0.0</c:v>
                 </c:pt>
@@ -1536,12 +1601,15 @@
                   <c:v>1.0</c:v>
                 </c:pt>
                 <c:pt idx="8">
-                  <c:v>1.0</c:v>
+                  <c:v>2.0</c:v>
                 </c:pt>
                 <c:pt idx="9">
-                  <c:v>1.0</c:v>
+                  <c:v>2.0</c:v>
                 </c:pt>
                 <c:pt idx="10">
+                  <c:v>2.0</c:v>
+                </c:pt>
+                <c:pt idx="11">
                   <c:v>2.0</c:v>
                 </c:pt>
               </c:numCache>
@@ -1559,21 +1627,21 @@
         </c:dLbls>
         <c:marker val="1"/>
         <c:smooth val="0"/>
-        <c:axId val="498843960"/>
-        <c:axId val="498847160"/>
+        <c:axId val="103144408"/>
+        <c:axId val="641702600"/>
       </c:lineChart>
       <c:dateAx>
-        <c:axId val="498843960"/>
+        <c:axId val="103144408"/>
         <c:scaling>
           <c:orientation val="minMax"/>
         </c:scaling>
         <c:delete val="0"/>
         <c:axPos val="b"/>
-        <c:numFmt formatCode="m/d/yyyy" sourceLinked="1"/>
+        <c:numFmt formatCode="m/d/yy" sourceLinked="1"/>
         <c:majorTickMark val="out"/>
         <c:minorTickMark val="none"/>
         <c:tickLblPos val="nextTo"/>
-        <c:crossAx val="498847160"/>
+        <c:crossAx val="641702600"/>
         <c:crosses val="autoZero"/>
         <c:auto val="1"/>
         <c:lblOffset val="100"/>
@@ -1582,18 +1650,18 @@
         <c:majorTimeUnit val="days"/>
       </c:dateAx>
       <c:valAx>
-        <c:axId val="498847160"/>
+        <c:axId val="641702600"/>
         <c:scaling>
           <c:orientation val="minMax"/>
         </c:scaling>
         <c:delete val="0"/>
         <c:axPos val="l"/>
         <c:majorGridlines/>
-        <c:numFmt formatCode="General" sourceLinked="0"/>
+        <c:numFmt formatCode="General" sourceLinked="1"/>
         <c:majorTickMark val="out"/>
         <c:minorTickMark val="none"/>
         <c:tickLblPos val="nextTo"/>
-        <c:crossAx val="498843960"/>
+        <c:crossAx val="103144408"/>
         <c:crosses val="autoZero"/>
         <c:crossBetween val="between"/>
       </c:valAx>
@@ -1607,7 +1675,7 @@
           <c:x val="0.696629629629631"/>
           <c:y val="0.0611463741704776"/>
           <c:w val="0.281148148148148"/>
-          <c:h val="0.868984630196336"/>
+          <c:h val="0.868984630196335"/>
         </c:manualLayout>
       </c:layout>
       <c:overlay val="0"/>
@@ -1705,7 +1773,7 @@
             <a:fld id="{C112A329-A621-46CF-9879-55386638107A}" type="datetimeFigureOut">
               <a:rPr lang="en-US" smtClean="0"/>
               <a:pPr/>
-              <a:t>4/11/12</a:t>
+              <a:t>4/12/12</a:t>
             </a:fld>
             <a:endParaRPr lang="en-US"/>
           </a:p>
@@ -1872,7 +1940,7 @@
             <a:fld id="{BD60C36C-12F0-7C4E-92CA-6378FCE84C25}" type="datetimeFigureOut">
               <a:rPr lang="en-US" smtClean="0"/>
               <a:pPr/>
-              <a:t>4/11/12</a:t>
+              <a:t>4/12/12</a:t>
             </a:fld>
             <a:endParaRPr lang="en-US"/>
           </a:p>
@@ -2382,7 +2450,7 @@
             <a:fld id="{771D59A8-134A-704F-A93D-2B943B1F389E}" type="slidenum">
               <a:rPr lang="en-US" smtClean="0"/>
               <a:pPr/>
-              <a:t>14</a:t>
+              <a:t>15</a:t>
             </a:fld>
             <a:endParaRPr lang="en-US"/>
           </a:p>
@@ -2583,7 +2651,7 @@
             <a:fld id="{139B3C01-E862-4DB4-BCEC-DF1E3BE1BC60}" type="datetime1">
               <a:rPr lang="en-US" smtClean="0"/>
               <a:pPr/>
-              <a:t>4/11/12</a:t>
+              <a:t>4/12/12</a:t>
             </a:fld>
             <a:endParaRPr lang="en-US"/>
           </a:p>
@@ -2750,7 +2818,7 @@
             <a:fld id="{547F92B4-6920-47BB-99E2-8578B712FA0E}" type="datetime1">
               <a:rPr lang="en-US" smtClean="0"/>
               <a:pPr/>
-              <a:t>4/11/12</a:t>
+              <a:t>4/12/12</a:t>
             </a:fld>
             <a:endParaRPr lang="en-US"/>
           </a:p>
@@ -2927,7 +2995,7 @@
             <a:fld id="{32CFDD96-6602-48F6-B49B-95CBB161E9FF}" type="datetime1">
               <a:rPr lang="en-US" smtClean="0"/>
               <a:pPr/>
-              <a:t>4/11/12</a:t>
+              <a:t>4/12/12</a:t>
             </a:fld>
             <a:endParaRPr lang="en-US"/>
           </a:p>
@@ -3094,7 +3162,7 @@
             <a:fld id="{F42C77AB-5BB1-4513-B9EC-D724674E8083}" type="datetime1">
               <a:rPr lang="en-US" smtClean="0"/>
               <a:pPr/>
-              <a:t>4/11/12</a:t>
+              <a:t>4/12/12</a:t>
             </a:fld>
             <a:endParaRPr lang="en-US"/>
           </a:p>
@@ -3337,7 +3405,7 @@
             <a:fld id="{C0622839-A52D-4035-9073-66B9206EBAEE}" type="datetime1">
               <a:rPr lang="en-US" smtClean="0"/>
               <a:pPr/>
-              <a:t>4/11/12</a:t>
+              <a:t>4/12/12</a:t>
             </a:fld>
             <a:endParaRPr lang="en-US"/>
           </a:p>
@@ -3622,7 +3690,7 @@
             <a:fld id="{C96ECEE5-E6EF-402F-9B28-2AFF8B459D04}" type="datetime1">
               <a:rPr lang="en-US" smtClean="0"/>
               <a:pPr/>
-              <a:t>4/11/12</a:t>
+              <a:t>4/12/12</a:t>
             </a:fld>
             <a:endParaRPr lang="en-US"/>
           </a:p>
@@ -4041,7 +4109,7 @@
             <a:fld id="{3DC265E6-4252-48E7-A7BE-337D91BBA0AF}" type="datetime1">
               <a:rPr lang="en-US" smtClean="0"/>
               <a:pPr/>
-              <a:t>4/11/12</a:t>
+              <a:t>4/12/12</a:t>
             </a:fld>
             <a:endParaRPr lang="en-US"/>
           </a:p>
@@ -4156,7 +4224,7 @@
             <a:fld id="{86D570BA-06C8-4A33-99F8-722C15CBE3B1}" type="datetime1">
               <a:rPr lang="en-US" smtClean="0"/>
               <a:pPr/>
-              <a:t>4/11/12</a:t>
+              <a:t>4/12/12</a:t>
             </a:fld>
             <a:endParaRPr lang="en-US"/>
           </a:p>
@@ -4248,7 +4316,7 @@
             <a:fld id="{C255B55A-6D97-4412-98D3-AB1F983BF2AD}" type="datetime1">
               <a:rPr lang="en-US" smtClean="0"/>
               <a:pPr/>
-              <a:t>4/11/12</a:t>
+              <a:t>4/12/12</a:t>
             </a:fld>
             <a:endParaRPr lang="en-US"/>
           </a:p>
@@ -4522,7 +4590,7 @@
             <a:fld id="{6401D403-EA04-4E1D-A2D0-418AC0CCAC24}" type="datetime1">
               <a:rPr lang="en-US" smtClean="0"/>
               <a:pPr/>
-              <a:t>4/11/12</a:t>
+              <a:t>4/12/12</a:t>
             </a:fld>
             <a:endParaRPr lang="en-US"/>
           </a:p>
@@ -4772,7 +4840,7 @@
             <a:fld id="{15CF591B-FF43-4CF6-828F-71951A785747}" type="datetime1">
               <a:rPr lang="en-US" smtClean="0"/>
               <a:pPr/>
-              <a:t>4/11/12</a:t>
+              <a:t>4/12/12</a:t>
             </a:fld>
             <a:endParaRPr lang="en-US"/>
           </a:p>
@@ -4982,7 +5050,7 @@
             <a:fld id="{149CDA22-D52D-4407-B715-1A661539B3B4}" type="datetime1">
               <a:rPr lang="en-US" smtClean="0"/>
               <a:pPr/>
-              <a:t>4/11/12</a:t>
+              <a:t>4/12/12</a:t>
             </a:fld>
             <a:endParaRPr lang="en-US"/>
           </a:p>
@@ -5456,11 +5524,7 @@
           <a:p>
             <a:r>
               <a:rPr lang="en-US" dirty="0" smtClean="0"/>
-              <a:t>A wind tunnel for kids</a:t>
-            </a:r>
-            <a:r>
-              <a:rPr lang="en-US" dirty="0" smtClean="0"/>
-              <a:t>…</a:t>
+              <a:t>A wind tunnel for kids…</a:t>
             </a:r>
           </a:p>
           <a:p>
@@ -5514,15 +5578,7 @@
           <a:p>
             <a:r>
               <a:rPr lang="en-US" sz="3200" dirty="0" smtClean="0"/>
-              <a:t>April </a:t>
-            </a:r>
-            <a:r>
-              <a:rPr lang="en-US" sz="3200" dirty="0" smtClean="0"/>
-              <a:t>12, </a:t>
-            </a:r>
-            <a:r>
-              <a:rPr lang="en-US" sz="3200" dirty="0" smtClean="0"/>
-              <a:t>2012</a:t>
+              <a:t>April 12, 2012</a:t>
             </a:r>
             <a:endParaRPr lang="en-US" sz="3200" dirty="0"/>
           </a:p>
@@ -5806,6 +5862,192 @@
       </p:grpSpPr>
       <p:pic>
         <p:nvPicPr>
+          <p:cNvPr id="5" name="Picture 4" descr="Screen shot 2012-04-11 at 2.22.43 PM.png"/>
+          <p:cNvPicPr>
+            <a:picLocks noChangeAspect="1"/>
+          </p:cNvPicPr>
+          <p:nvPr/>
+        </p:nvPicPr>
+        <p:blipFill>
+          <a:blip r:embed="rId2">
+            <a:extLst>
+              <a:ext uri="{28A0092B-C50C-407E-A947-70E740481C1C}">
+                <a14:useLocalDpi xmlns:a14="http://schemas.microsoft.com/office/drawing/2010/main" val="0"/>
+              </a:ext>
+            </a:extLst>
+          </a:blip>
+          <a:stretch>
+            <a:fillRect/>
+          </a:stretch>
+        </p:blipFill>
+        <p:spPr>
+          <a:xfrm>
+            <a:off x="4097051" y="3352800"/>
+            <a:ext cx="4513549" cy="3276600"/>
+          </a:xfrm>
+          <a:prstGeom prst="rect">
+            <a:avLst/>
+          </a:prstGeom>
+        </p:spPr>
+      </p:pic>
+      <p:sp>
+        <p:nvSpPr>
+          <p:cNvPr id="2" name="Title 1"/>
+          <p:cNvSpPr>
+            <a:spLocks noGrp="1"/>
+          </p:cNvSpPr>
+          <p:nvPr>
+            <p:ph type="title"/>
+          </p:nvPr>
+        </p:nvSpPr>
+        <p:spPr/>
+        <p:txBody>
+          <a:bodyPr/>
+          <a:lstStyle/>
+          <a:p>
+            <a:r>
+              <a:rPr lang="en-US" dirty="0" smtClean="0"/>
+              <a:t>Status of Requirements</a:t>
+            </a:r>
+            <a:endParaRPr lang="en-US" dirty="0"/>
+          </a:p>
+        </p:txBody>
+      </p:sp>
+      <p:sp>
+        <p:nvSpPr>
+          <p:cNvPr id="3" name="Content Placeholder 2"/>
+          <p:cNvSpPr>
+            <a:spLocks noGrp="1"/>
+          </p:cNvSpPr>
+          <p:nvPr>
+            <p:ph idx="1"/>
+          </p:nvPr>
+        </p:nvSpPr>
+        <p:spPr/>
+        <p:txBody>
+          <a:bodyPr>
+            <a:normAutofit/>
+          </a:bodyPr>
+          <a:lstStyle/>
+          <a:p>
+            <a:r>
+              <a:rPr lang="nl-NL" dirty="0" smtClean="0"/>
+              <a:t>19 of 24 </a:t>
+            </a:r>
+            <a:r>
+              <a:rPr lang="en-US" dirty="0"/>
+              <a:t>requirements </a:t>
+            </a:r>
+            <a:r>
+              <a:rPr lang="en-US" dirty="0" smtClean="0"/>
+              <a:t>completed</a:t>
+            </a:r>
+          </a:p>
+          <a:p>
+            <a:r>
+              <a:rPr lang="en-US" dirty="0" smtClean="0"/>
+              <a:t>4 of last 6 </a:t>
+            </a:r>
+            <a:r>
+              <a:rPr lang="en-US" dirty="0"/>
+              <a:t>requirements </a:t>
+            </a:r>
+            <a:r>
+              <a:rPr lang="en-US" dirty="0" smtClean="0"/>
+              <a:t>have started</a:t>
+            </a:r>
+          </a:p>
+          <a:p>
+            <a:r>
+              <a:rPr lang="en-US" dirty="0" smtClean="0"/>
+              <a:t>2 requirements not yet started</a:t>
+            </a:r>
+          </a:p>
+          <a:p>
+            <a:r>
+              <a:rPr lang="nl-NL" dirty="0" smtClean="0"/>
+              <a:t>Details </a:t>
+            </a:r>
+            <a:r>
+              <a:rPr lang="nl-NL" dirty="0"/>
+              <a:t>@ </a:t>
+            </a:r>
+            <a:r>
+              <a:rPr lang="nl-NL" dirty="0">
+                <a:hlinkClick r:id="rId3"/>
+              </a:rPr>
+              <a:t>http://goo.gl/</a:t>
+            </a:r>
+            <a:r>
+              <a:rPr lang="nl-NL" dirty="0" smtClean="0">
+                <a:hlinkClick r:id="rId3"/>
+              </a:rPr>
+              <a:t>ipJjU</a:t>
+            </a:r>
+            <a:r>
+              <a:rPr lang="nl-NL" dirty="0" smtClean="0"/>
+              <a:t> </a:t>
+            </a:r>
+            <a:endParaRPr lang="en-US" dirty="0"/>
+          </a:p>
+        </p:txBody>
+      </p:sp>
+      <p:sp>
+        <p:nvSpPr>
+          <p:cNvPr id="4" name="Slide Number Placeholder 3"/>
+          <p:cNvSpPr>
+            <a:spLocks noGrp="1"/>
+          </p:cNvSpPr>
+          <p:nvPr>
+            <p:ph type="sldNum" sz="quarter" idx="12"/>
+          </p:nvPr>
+        </p:nvSpPr>
+        <p:spPr/>
+        <p:txBody>
+          <a:bodyPr/>
+          <a:lstStyle/>
+          <a:p>
+            <a:fld id="{2F5F0D6A-11AB-4DFD-AEC9-4019EB08637C}" type="slidenum">
+              <a:rPr lang="en-US" smtClean="0"/>
+              <a:pPr/>
+              <a:t>10</a:t>
+            </a:fld>
+            <a:endParaRPr lang="en-US"/>
+          </a:p>
+        </p:txBody>
+      </p:sp>
+    </p:spTree>
+    <p:extLst>
+      <p:ext uri="{BB962C8B-B14F-4D97-AF65-F5344CB8AC3E}">
+        <p14:creationId xmlns:p14="http://schemas.microsoft.com/office/powerpoint/2010/main" val="2362761640"/>
+      </p:ext>
+    </p:extLst>
+  </p:cSld>
+  <p:clrMapOvr>
+    <a:masterClrMapping/>
+  </p:clrMapOvr>
+</p:sld>
+</file>
+
+<file path=ppt/slides/slide11.xml><?xml version="1.0" encoding="utf-8"?>
+<p:sld xmlns:a="http://schemas.openxmlformats.org/drawingml/2006/main" xmlns:r="http://schemas.openxmlformats.org/officeDocument/2006/relationships" xmlns:p="http://schemas.openxmlformats.org/presentationml/2006/main">
+  <p:cSld>
+    <p:spTree>
+      <p:nvGrpSpPr>
+        <p:cNvPr id="1" name=""/>
+        <p:cNvGrpSpPr/>
+        <p:nvPr/>
+      </p:nvGrpSpPr>
+      <p:grpSpPr>
+        <a:xfrm>
+          <a:off x="0" y="0"/>
+          <a:ext cx="0" cy="0"/>
+          <a:chOff x="0" y="0"/>
+          <a:chExt cx="0" cy="0"/>
+        </a:xfrm>
+      </p:grpSpPr>
+      <p:pic>
+        <p:nvPicPr>
           <p:cNvPr id="12" name="Picture 2" descr="C:\Users\DAVIS-CS\Desktop\Agile Suit Alex.jpg"/>
           <p:cNvPicPr>
             <a:picLocks noChangeAspect="1" noChangeArrowheads="1"/>
@@ -5830,22 +6072,6 @@
           <a:noFill/>
         </p:spPr>
       </p:pic>
-      <p:graphicFrame>
-        <p:nvGraphicFramePr>
-          <p:cNvPr id="8" name="Chart 7"/>
-          <p:cNvGraphicFramePr/>
-          <p:nvPr/>
-        </p:nvGraphicFramePr>
-        <p:xfrm>
-          <a:off x="2819400" y="4343400"/>
-          <a:ext cx="3409950" cy="2181225"/>
-        </p:xfrm>
-        <a:graphic>
-          <a:graphicData uri="http://schemas.openxmlformats.org/drawingml/2006/chart">
-            <c:chart xmlns:c="http://schemas.openxmlformats.org/drawingml/2006/chart" xmlns:r="http://schemas.openxmlformats.org/officeDocument/2006/relationships" r:id="rId3"/>
-          </a:graphicData>
-        </a:graphic>
-      </p:graphicFrame>
       <p:sp>
         <p:nvSpPr>
           <p:cNvPr id="2" name="Title 1"/>
@@ -5889,7 +6115,7 @@
             <a:fld id="{2F5F0D6A-11AB-4DFD-AEC9-4019EB08637C}" type="slidenum">
               <a:rPr lang="en-US" smtClean="0"/>
               <a:pPr/>
-              <a:t>10</a:t>
+              <a:t>11</a:t>
             </a:fld>
             <a:endParaRPr lang="en-US"/>
           </a:p>
@@ -5904,7 +6130,7 @@
           <p:nvPr>
             <p:extLst>
               <p:ext uri="{D42A27DB-BD31-4B8C-83A1-F6EECF244321}">
-                <p14:modId xmlns:p14="http://schemas.microsoft.com/office/powerpoint/2010/main" val="1377027535"/>
+                <p14:modId xmlns:p14="http://schemas.microsoft.com/office/powerpoint/2010/main" val="100778047"/>
               </p:ext>
             </p:extLst>
           </p:nvPr>
@@ -6278,11 +6504,16 @@
                       <a:r>
                         <a:rPr lang="en-US" dirty="0" smtClean="0">
                           <a:solidFill>
-                            <a:srgbClr val="000000"/>
+                            <a:srgbClr val="FF0000"/>
                           </a:solidFill>
                         </a:rPr>
-                        <a:t>134</a:t>
+                        <a:t>149</a:t>
                       </a:r>
+                      <a:endParaRPr lang="en-US" dirty="0" smtClean="0">
+                        <a:solidFill>
+                          <a:srgbClr val="FF0000"/>
+                        </a:solidFill>
+                      </a:endParaRPr>
                     </a:p>
                     <a:p>
                       <a:endParaRPr lang="en-US" dirty="0" smtClean="0">
@@ -6313,6 +6544,30 @@
           </a:graphicData>
         </a:graphic>
       </p:graphicFrame>
+      <p:graphicFrame>
+        <p:nvGraphicFramePr>
+          <p:cNvPr id="7" name="Chart 6"/>
+          <p:cNvGraphicFramePr>
+            <a:graphicFrameLocks/>
+          </p:cNvGraphicFramePr>
+          <p:nvPr>
+            <p:extLst>
+              <p:ext uri="{D42A27DB-BD31-4B8C-83A1-F6EECF244321}">
+                <p14:modId xmlns:p14="http://schemas.microsoft.com/office/powerpoint/2010/main" val="1027446532"/>
+              </p:ext>
+            </p:extLst>
+          </p:nvPr>
+        </p:nvGraphicFramePr>
+        <p:xfrm>
+          <a:off x="2514600" y="4191000"/>
+          <a:ext cx="3849158" cy="2041525"/>
+        </p:xfrm>
+        <a:graphic>
+          <a:graphicData uri="http://schemas.openxmlformats.org/drawingml/2006/chart">
+            <c:chart xmlns:c="http://schemas.openxmlformats.org/drawingml/2006/chart" xmlns:r="http://schemas.openxmlformats.org/officeDocument/2006/relationships" r:id="rId3"/>
+          </a:graphicData>
+        </a:graphic>
+      </p:graphicFrame>
     </p:spTree>
   </p:cSld>
   <p:clrMapOvr>
@@ -6328,7 +6583,7 @@
 </p:sld>
 </file>
 
-<file path=ppt/slides/slide11.xml><?xml version="1.0" encoding="utf-8"?>
+<file path=ppt/slides/slide12.xml><?xml version="1.0" encoding="utf-8"?>
 <p:sld xmlns:a="http://schemas.openxmlformats.org/drawingml/2006/main" xmlns:r="http://schemas.openxmlformats.org/officeDocument/2006/relationships" xmlns:p="http://schemas.openxmlformats.org/presentationml/2006/main">
   <p:cSld>
     <p:spTree>
@@ -6414,7 +6669,7 @@
             <a:fld id="{2F5F0D6A-11AB-4DFD-AEC9-4019EB08637C}" type="slidenum">
               <a:rPr lang="en-US" smtClean="0"/>
               <a:pPr/>
-              <a:t>11</a:t>
+              <a:t>12</a:t>
             </a:fld>
             <a:endParaRPr lang="en-US"/>
           </a:p>
@@ -6429,7 +6684,7 @@
           <p:nvPr>
             <p:extLst>
               <p:ext uri="{D42A27DB-BD31-4B8C-83A1-F6EECF244321}">
-                <p14:modId xmlns:p14="http://schemas.microsoft.com/office/powerpoint/2010/main" val="1011559677"/>
+                <p14:modId xmlns:p14="http://schemas.microsoft.com/office/powerpoint/2010/main" val="2706094553"/>
               </p:ext>
             </p:extLst>
           </p:nvPr>
@@ -6672,11 +6927,16 @@
                       <a:r>
                         <a:rPr lang="en-US" dirty="0" smtClean="0">
                           <a:solidFill>
-                            <a:schemeClr val="tx1"/>
+                            <a:srgbClr val="FF0000"/>
                           </a:solidFill>
                         </a:rPr>
-                        <a:t>114</a:t>
+                        <a:t>131</a:t>
                       </a:r>
+                      <a:endParaRPr lang="en-US" dirty="0" smtClean="0">
+                        <a:solidFill>
+                          <a:srgbClr val="FF0000"/>
+                        </a:solidFill>
+                      </a:endParaRPr>
                     </a:p>
                     <a:p>
                       <a:endParaRPr lang="en-US" dirty="0">
@@ -6765,13 +7025,21 @@
       </p:graphicFrame>
       <p:graphicFrame>
         <p:nvGraphicFramePr>
-          <p:cNvPr id="8" name="Chart 7"/>
-          <p:cNvGraphicFramePr/>
-          <p:nvPr/>
+          <p:cNvPr id="10" name="Chart 9"/>
+          <p:cNvGraphicFramePr>
+            <a:graphicFrameLocks/>
+          </p:cNvGraphicFramePr>
+          <p:nvPr>
+            <p:extLst>
+              <p:ext uri="{D42A27DB-BD31-4B8C-83A1-F6EECF244321}">
+                <p14:modId xmlns:p14="http://schemas.microsoft.com/office/powerpoint/2010/main" val="3862956526"/>
+              </p:ext>
+            </p:extLst>
+          </p:nvPr>
         </p:nvGraphicFramePr>
         <p:xfrm>
-          <a:off x="762000" y="3886200"/>
-          <a:ext cx="3429000" cy="2438400"/>
+          <a:off x="4572000" y="3886200"/>
+          <a:ext cx="3875617" cy="2041525"/>
         </p:xfrm>
         <a:graphic>
           <a:graphicData uri="http://schemas.openxmlformats.org/drawingml/2006/chart">
@@ -6781,13 +7049,21 @@
       </p:graphicFrame>
       <p:graphicFrame>
         <p:nvGraphicFramePr>
-          <p:cNvPr id="9" name="Chart 8"/>
-          <p:cNvGraphicFramePr/>
-          <p:nvPr/>
+          <p:cNvPr id="12" name="Chart 11"/>
+          <p:cNvGraphicFramePr>
+            <a:graphicFrameLocks/>
+          </p:cNvGraphicFramePr>
+          <p:nvPr>
+            <p:extLst>
+              <p:ext uri="{D42A27DB-BD31-4B8C-83A1-F6EECF244321}">
+                <p14:modId xmlns:p14="http://schemas.microsoft.com/office/powerpoint/2010/main" val="2703319539"/>
+              </p:ext>
+            </p:extLst>
+          </p:nvPr>
         </p:nvGraphicFramePr>
         <p:xfrm>
-          <a:off x="4610099" y="3876676"/>
-          <a:ext cx="3547925" cy="2438399"/>
+          <a:off x="152400" y="3581400"/>
+          <a:ext cx="4419600" cy="2895600"/>
         </p:xfrm>
         <a:graphic>
           <a:graphicData uri="http://schemas.openxmlformats.org/drawingml/2006/chart">
@@ -6810,7 +7086,7 @@
 </p:sld>
 </file>
 
-<file path=ppt/slides/slide12.xml><?xml version="1.0" encoding="utf-8"?>
+<file path=ppt/slides/slide13.xml><?xml version="1.0" encoding="utf-8"?>
 <p:sld xmlns:a="http://schemas.openxmlformats.org/drawingml/2006/main" xmlns:r="http://schemas.openxmlformats.org/officeDocument/2006/relationships" xmlns:p="http://schemas.openxmlformats.org/presentationml/2006/main">
   <p:cSld>
     <p:spTree>
@@ -6896,7 +7172,7 @@
             <a:fld id="{2F5F0D6A-11AB-4DFD-AEC9-4019EB08637C}" type="slidenum">
               <a:rPr lang="en-US" smtClean="0"/>
               <a:pPr/>
-              <a:t>12</a:t>
+              <a:t>13</a:t>
             </a:fld>
             <a:endParaRPr lang="en-US"/>
           </a:p>
@@ -7428,13 +7704,21 @@
       </p:pic>
       <p:graphicFrame>
         <p:nvGraphicFramePr>
-          <p:cNvPr id="10" name="Chart 9"/>
-          <p:cNvGraphicFramePr/>
-          <p:nvPr/>
+          <p:cNvPr id="11" name="Chart 10"/>
+          <p:cNvGraphicFramePr>
+            <a:graphicFrameLocks/>
+          </p:cNvGraphicFramePr>
+          <p:nvPr>
+            <p:extLst>
+              <p:ext uri="{D42A27DB-BD31-4B8C-83A1-F6EECF244321}">
+                <p14:modId xmlns:p14="http://schemas.microsoft.com/office/powerpoint/2010/main" val="1265629899"/>
+              </p:ext>
+            </p:extLst>
+          </p:nvPr>
         </p:nvGraphicFramePr>
         <p:xfrm>
-          <a:off x="2819400" y="4343400"/>
-          <a:ext cx="3429000" cy="2181225"/>
+          <a:off x="2514600" y="4343400"/>
+          <a:ext cx="3868208" cy="2028825"/>
         </p:xfrm>
         <a:graphic>
           <a:graphicData uri="http://schemas.openxmlformats.org/drawingml/2006/chart">
@@ -7457,7 +7741,7 @@
 </p:sld>
 </file>
 
-<file path=ppt/slides/slide13.xml><?xml version="1.0" encoding="utf-8"?>
+<file path=ppt/slides/slide14.xml><?xml version="1.0" encoding="utf-8"?>
 <p:sld xmlns:a="http://schemas.openxmlformats.org/drawingml/2006/main" xmlns:r="http://schemas.openxmlformats.org/officeDocument/2006/relationships" xmlns:p="http://schemas.openxmlformats.org/presentationml/2006/main">
   <p:cSld>
     <p:spTree>
@@ -7490,21 +7774,103 @@
           <a:lstStyle/>
           <a:p>
             <a:r>
-              <a:rPr lang="en-US" dirty="0" smtClean="0"/>
-              <a:t>Maui</a:t>
-            </a:r>
-            <a:endParaRPr lang="en-US" dirty="0"/>
-          </a:p>
-        </p:txBody>
-      </p:sp>
-      <p:sp>
-        <p:nvSpPr>
-          <p:cNvPr id="4" name="Slide Number Placeholder 3"/>
+              <a:rPr lang="en-US" b="1" cap="all" dirty="0" smtClean="0">
+                <a:ln w="9000" cmpd="sng">
+                  <a:solidFill>
+                    <a:schemeClr val="accent4">
+                      <a:shade val="50000"/>
+                      <a:satMod val="120000"/>
+                    </a:schemeClr>
+                  </a:solidFill>
+                  <a:prstDash val="solid"/>
+                </a:ln>
+                <a:gradFill>
+                  <a:gsLst>
+                    <a:gs pos="0">
+                      <a:schemeClr val="accent4">
+                        <a:shade val="20000"/>
+                        <a:satMod val="245000"/>
+                      </a:schemeClr>
+                    </a:gs>
+                    <a:gs pos="43000">
+                      <a:schemeClr val="accent4">
+                        <a:satMod val="255000"/>
+                      </a:schemeClr>
+                    </a:gs>
+                    <a:gs pos="48000">
+                      <a:schemeClr val="accent4">
+                        <a:shade val="85000"/>
+                        <a:satMod val="255000"/>
+                      </a:schemeClr>
+                    </a:gs>
+                    <a:gs pos="100000">
+                      <a:schemeClr val="accent4">
+                        <a:shade val="20000"/>
+                        <a:satMod val="245000"/>
+                      </a:schemeClr>
+                    </a:gs>
+                  </a:gsLst>
+                  <a:lin ang="5400000"/>
+                </a:gradFill>
+                <a:effectLst>
+                  <a:reflection blurRad="12700" stA="28000" endPos="45000" dist="1000" dir="5400000" sy="-100000" algn="bl" rotWithShape="0"/>
+                </a:effectLst>
+              </a:rPr>
+              <a:t>You’re Invited!</a:t>
+            </a:r>
+            <a:endParaRPr lang="en-US" b="1" cap="all" dirty="0">
+              <a:ln w="9000" cmpd="sng">
+                <a:solidFill>
+                  <a:schemeClr val="accent4">
+                    <a:shade val="50000"/>
+                    <a:satMod val="120000"/>
+                  </a:schemeClr>
+                </a:solidFill>
+                <a:prstDash val="solid"/>
+              </a:ln>
+              <a:gradFill>
+                <a:gsLst>
+                  <a:gs pos="0">
+                    <a:schemeClr val="accent4">
+                      <a:shade val="20000"/>
+                      <a:satMod val="245000"/>
+                    </a:schemeClr>
+                  </a:gs>
+                  <a:gs pos="43000">
+                    <a:schemeClr val="accent4">
+                      <a:satMod val="255000"/>
+                    </a:schemeClr>
+                  </a:gs>
+                  <a:gs pos="48000">
+                    <a:schemeClr val="accent4">
+                      <a:shade val="85000"/>
+                      <a:satMod val="255000"/>
+                    </a:schemeClr>
+                  </a:gs>
+                  <a:gs pos="100000">
+                    <a:schemeClr val="accent4">
+                      <a:shade val="20000"/>
+                      <a:satMod val="245000"/>
+                    </a:schemeClr>
+                  </a:gs>
+                </a:gsLst>
+                <a:lin ang="5400000"/>
+              </a:gradFill>
+              <a:effectLst>
+                <a:reflection blurRad="12700" stA="28000" endPos="45000" dist="1000" dir="5400000" sy="-100000" algn="bl" rotWithShape="0"/>
+              </a:effectLst>
+            </a:endParaRPr>
+          </a:p>
+        </p:txBody>
+      </p:sp>
+      <p:sp>
+        <p:nvSpPr>
+          <p:cNvPr id="3" name="Content Placeholder 2"/>
           <p:cNvSpPr>
             <a:spLocks noGrp="1"/>
           </p:cNvSpPr>
           <p:nvPr>
-            <p:ph type="sldNum" sz="quarter" idx="12"/>
+            <p:ph idx="1"/>
           </p:nvPr>
         </p:nvSpPr>
         <p:spPr/>
@@ -7512,79 +7878,132 @@
           <a:bodyPr/>
           <a:lstStyle/>
           <a:p>
+            <a:pPr>
+              <a:buFont typeface="Wingdings" charset="2"/>
+              <a:buChar char="ü"/>
+            </a:pPr>
+            <a:r>
+              <a:rPr lang="en-US" b="1" i="1" u="sng" dirty="0" smtClean="0"/>
+              <a:t>Who:</a:t>
+            </a:r>
+            <a:r>
+              <a:rPr lang="en-US" dirty="0" smtClean="0"/>
+              <a:t> Dr. </a:t>
+            </a:r>
+            <a:r>
+              <a:rPr lang="en-US" dirty="0" err="1" smtClean="0"/>
+              <a:t>Kulick</a:t>
+            </a:r>
+            <a:r>
+              <a:rPr lang="en-US" dirty="0" smtClean="0"/>
+              <a:t>, Tullahoma Hands on Science Center customers, Tunnel-K Development Team, and all CPE 658 participants</a:t>
+            </a:r>
+          </a:p>
+          <a:p>
+            <a:pPr>
+              <a:buFont typeface="Wingdings" charset="2"/>
+              <a:buChar char="ü"/>
+            </a:pPr>
+            <a:r>
+              <a:rPr lang="en-US" b="1" i="1" u="sng" dirty="0" smtClean="0"/>
+              <a:t>What:</a:t>
+            </a:r>
+            <a:r>
+              <a:rPr lang="en-US" b="1" dirty="0" smtClean="0"/>
+              <a:t> </a:t>
+            </a:r>
+            <a:r>
+              <a:rPr lang="en-US" dirty="0" smtClean="0"/>
+              <a:t>Tunnel-K Final Qualification Test</a:t>
+            </a:r>
+          </a:p>
+          <a:p>
+            <a:pPr>
+              <a:buFont typeface="Wingdings" charset="2"/>
+              <a:buChar char="ü"/>
+            </a:pPr>
+            <a:r>
+              <a:rPr lang="en-US" b="1" i="1" u="sng" dirty="0" smtClean="0"/>
+              <a:t>When:</a:t>
+            </a:r>
+            <a:r>
+              <a:rPr lang="en-US" b="1" dirty="0" smtClean="0"/>
+              <a:t> </a:t>
+            </a:r>
+            <a:r>
+              <a:rPr lang="en-US" dirty="0" smtClean="0"/>
+              <a:t>2pm CDT, Friday, April 27, 2012</a:t>
+            </a:r>
+          </a:p>
+          <a:p>
+            <a:pPr>
+              <a:buFont typeface="Wingdings" charset="2"/>
+              <a:buChar char="ü"/>
+            </a:pPr>
+            <a:r>
+              <a:rPr lang="en-US" b="1" i="1" u="sng" dirty="0" smtClean="0"/>
+              <a:t>Where:</a:t>
+            </a:r>
+            <a:r>
+              <a:rPr lang="en-US" b="1" dirty="0" smtClean="0"/>
+              <a:t> </a:t>
+            </a:r>
+            <a:r>
+              <a:rPr lang="en-US" dirty="0" smtClean="0"/>
+              <a:t>Tullahoma Hands on Science Center, </a:t>
+            </a:r>
+            <a:r>
+              <a:rPr lang="de-DE" dirty="0"/>
+              <a:t>101 Mitchell </a:t>
+            </a:r>
+            <a:r>
+              <a:rPr lang="de-DE" dirty="0" err="1" smtClean="0"/>
+              <a:t>Blvd</a:t>
+            </a:r>
+            <a:r>
+              <a:rPr lang="de-DE" dirty="0" smtClean="0"/>
+              <a:t>, </a:t>
+            </a:r>
+            <a:r>
+              <a:rPr lang="de-DE" dirty="0" err="1" smtClean="0"/>
+              <a:t>Tullahoma</a:t>
+            </a:r>
+            <a:r>
+              <a:rPr lang="de-DE" dirty="0"/>
+              <a:t>, TN 37388</a:t>
+            </a:r>
+            <a:endParaRPr lang="en-US" dirty="0"/>
+          </a:p>
+        </p:txBody>
+      </p:sp>
+      <p:sp>
+        <p:nvSpPr>
+          <p:cNvPr id="4" name="Slide Number Placeholder 3"/>
+          <p:cNvSpPr>
+            <a:spLocks noGrp="1"/>
+          </p:cNvSpPr>
+          <p:nvPr>
+            <p:ph type="sldNum" sz="quarter" idx="12"/>
+          </p:nvPr>
+        </p:nvSpPr>
+        <p:spPr/>
+        <p:txBody>
+          <a:bodyPr/>
+          <a:lstStyle/>
+          <a:p>
             <a:fld id="{2F5F0D6A-11AB-4DFD-AEC9-4019EB08637C}" type="slidenum">
               <a:rPr lang="en-US" smtClean="0"/>
               <a:pPr/>
-              <a:t>13</a:t>
+              <a:t>14</a:t>
             </a:fld>
             <a:endParaRPr lang="en-US"/>
           </a:p>
         </p:txBody>
       </p:sp>
-      <p:pic>
-        <p:nvPicPr>
-          <p:cNvPr id="6" name="Picture 5" descr="PANO_20120408_170254.jpg"/>
-          <p:cNvPicPr>
-            <a:picLocks noChangeAspect="1"/>
-          </p:cNvPicPr>
-          <p:nvPr/>
-        </p:nvPicPr>
-        <p:blipFill>
-          <a:blip r:embed="rId2" cstate="print">
-            <a:extLst>
-              <a:ext uri="{28A0092B-C50C-407E-A947-70E740481C1C}">
-                <a14:useLocalDpi xmlns:a14="http://schemas.microsoft.com/office/drawing/2010/main" val="0"/>
-              </a:ext>
-            </a:extLst>
-          </a:blip>
-          <a:stretch>
-            <a:fillRect/>
-          </a:stretch>
-        </p:blipFill>
-        <p:spPr>
-          <a:xfrm>
-            <a:off x="381000" y="4038600"/>
-            <a:ext cx="7914078" cy="2362200"/>
-          </a:xfrm>
-          <a:prstGeom prst="rect">
-            <a:avLst/>
-          </a:prstGeom>
-        </p:spPr>
-      </p:pic>
-      <p:pic>
-        <p:nvPicPr>
-          <p:cNvPr id="5" name="Content Placeholder 4" descr="IMG_20120408_183722.jpg"/>
-          <p:cNvPicPr>
-            <a:picLocks noGrp="1" noChangeAspect="1"/>
-          </p:cNvPicPr>
-          <p:nvPr>
-            <p:ph idx="1"/>
-          </p:nvPr>
-        </p:nvPicPr>
-        <p:blipFill>
-          <a:blip r:embed="rId3" cstate="print">
-            <a:extLst>
-              <a:ext uri="{28A0092B-C50C-407E-A947-70E740481C1C}">
-                <a14:useLocalDpi xmlns:a14="http://schemas.microsoft.com/office/drawing/2010/main" val="0"/>
-              </a:ext>
-            </a:extLst>
-          </a:blip>
-          <a:srcRect t="13336" b="13336"/>
-          <a:stretch>
-            <a:fillRect/>
-          </a:stretch>
-        </p:blipFill>
-        <p:spPr>
-          <a:xfrm>
-            <a:off x="2286000" y="1371600"/>
-            <a:ext cx="4572320" cy="2514600"/>
-          </a:xfrm>
-        </p:spPr>
-      </p:pic>
     </p:spTree>
     <p:extLst>
       <p:ext uri="{BB962C8B-B14F-4D97-AF65-F5344CB8AC3E}">
-        <p14:creationId xmlns:p14="http://schemas.microsoft.com/office/powerpoint/2010/main" val="3989326727"/>
+        <p14:creationId xmlns:p14="http://schemas.microsoft.com/office/powerpoint/2010/main" val="3963528561"/>
       </p:ext>
     </p:extLst>
   </p:cSld>
@@ -7594,7 +8013,7 @@
 </p:sld>
 </file>
 
-<file path=ppt/slides/slide14.xml><?xml version="1.0" encoding="utf-8"?>
+<file path=ppt/slides/slide15.xml><?xml version="1.0" encoding="utf-8"?>
 <p:sld xmlns:a="http://schemas.openxmlformats.org/drawingml/2006/main" xmlns:r="http://schemas.openxmlformats.org/officeDocument/2006/relationships" xmlns:p="http://schemas.openxmlformats.org/presentationml/2006/main">
   <p:cSld>
     <p:spTree>
@@ -7677,7 +8096,7 @@
             </a:br>
             <a:r>
               <a:rPr lang="en-US" sz="4000" dirty="0"/>
-              <a:t>8</a:t>
+              <a:t>9</a:t>
             </a:r>
             <a:r>
               <a:rPr lang="en-US" sz="4000" dirty="0" smtClean="0"/>
@@ -7685,15 +8104,7 @@
             </a:r>
             <a:r>
               <a:rPr lang="en-US" sz="4000" dirty="0" smtClean="0"/>
-              <a:t>followers – </a:t>
-            </a:r>
-            <a:r>
-              <a:rPr lang="en-US" sz="4000" dirty="0" smtClean="0"/>
-              <a:t>49 </a:t>
-            </a:r>
-            <a:r>
-              <a:rPr lang="en-US" sz="4000" dirty="0" smtClean="0"/>
-              <a:t>tweets</a:t>
+              <a:t>followers – 49 tweets</a:t>
             </a:r>
             <a:endParaRPr lang="en-US" dirty="0"/>
           </a:p>
@@ -7785,7 +8196,7 @@
             <a:fld id="{2F5F0D6A-11AB-4DFD-AEC9-4019EB08637C}" type="slidenum">
               <a:rPr lang="en-US" smtClean="0"/>
               <a:pPr/>
-              <a:t>14</a:t>
+              <a:t>15</a:t>
             </a:fld>
             <a:endParaRPr lang="en-US"/>
           </a:p>
@@ -8016,7 +8427,6 @@
               <a:rPr lang="en-US" dirty="0" smtClean="0"/>
               <a:t>Virtual tunnel development</a:t>
             </a:r>
-            <a:endParaRPr lang="en-US" dirty="0" smtClean="0"/>
           </a:p>
           <a:p>
             <a:pPr lvl="1"/>
@@ -8091,11 +8501,7 @@
           <a:p>
             <a:r>
               <a:rPr lang="en-US" dirty="0" smtClean="0"/>
-              <a:t>Physical </a:t>
-            </a:r>
-            <a:r>
-              <a:rPr lang="en-US" dirty="0" smtClean="0"/>
-              <a:t>tunnel </a:t>
+              <a:t>Physical tunnel </a:t>
             </a:r>
             <a:r>
               <a:rPr lang="en-US" dirty="0" smtClean="0"/>
@@ -8103,22 +8509,22 @@
             </a:r>
           </a:p>
           <a:p>
+            <a:pPr lvl="1"/>
             <a:r>
               <a:rPr lang="en-US" dirty="0" smtClean="0"/>
-              <a:t>Requirements Evaluation/Traceability</a:t>
+              <a:t>New parts arrived</a:t>
             </a:r>
             <a:endParaRPr lang="en-US" dirty="0" smtClean="0"/>
           </a:p>
           <a:p>
             <a:r>
               <a:rPr lang="en-US" dirty="0" smtClean="0"/>
-              <a:t>Fun in the Maui sun</a:t>
-            </a:r>
-            <a:endParaRPr lang="en-US" dirty="0" smtClean="0"/>
-          </a:p>
-          <a:p>
-            <a:pPr lvl="1"/>
-            <a:endParaRPr lang="en-US" dirty="0" smtClean="0"/>
+              <a:t>Requirements </a:t>
+            </a:r>
+            <a:r>
+              <a:rPr lang="en-US" dirty="0" smtClean="0"/>
+              <a:t>Evaluation</a:t>
+            </a:r>
           </a:p>
           <a:p>
             <a:endParaRPr lang="en-US" dirty="0" smtClean="0"/>
@@ -9402,7 +9808,7 @@
       </p:grpSpPr>
       <p:pic>
         <p:nvPicPr>
-          <p:cNvPr id="5" name="Picture 4" descr="Screen shot 2012-04-11 at 2.22.43 PM.png"/>
+          <p:cNvPr id="10" name="Picture 9" descr="photo (1).JPG"/>
           <p:cNvPicPr>
             <a:picLocks noChangeAspect="1"/>
           </p:cNvPicPr>
@@ -9422,8 +9828,8 @@
         </p:blipFill>
         <p:spPr>
           <a:xfrm>
-            <a:off x="4097051" y="3352800"/>
-            <a:ext cx="4513549" cy="3276600"/>
+            <a:off x="5334000" y="4038600"/>
+            <a:ext cx="3276600" cy="2457450"/>
           </a:xfrm>
           <a:prstGeom prst="rect">
             <a:avLst/>
@@ -9447,91 +9853,42 @@
           <a:p>
             <a:r>
               <a:rPr lang="en-US" dirty="0" smtClean="0"/>
-              <a:t>Status of Requirements</a:t>
+              <a:t>New Parts for Physical Tunnel</a:t>
             </a:r>
             <a:endParaRPr lang="en-US" dirty="0"/>
           </a:p>
         </p:txBody>
       </p:sp>
-      <p:sp>
-        <p:nvSpPr>
-          <p:cNvPr id="3" name="Content Placeholder 2"/>
-          <p:cNvSpPr>
-            <a:spLocks noGrp="1"/>
-          </p:cNvSpPr>
+      <p:pic>
+        <p:nvPicPr>
+          <p:cNvPr id="5" name="Content Placeholder 4" descr="photo.JPG"/>
+          <p:cNvPicPr>
+            <a:picLocks noGrp="1" noChangeAspect="1"/>
+          </p:cNvPicPr>
           <p:nvPr>
             <p:ph idx="1"/>
           </p:nvPr>
-        </p:nvSpPr>
-        <p:spPr/>
-        <p:txBody>
-          <a:bodyPr>
-            <a:normAutofit/>
-          </a:bodyPr>
-          <a:lstStyle/>
-          <a:p>
-            <a:r>
-              <a:rPr lang="nl-NL" dirty="0" smtClean="0"/>
-              <a:t>19 of 24 </a:t>
-            </a:r>
-            <a:r>
-              <a:rPr lang="en-US" dirty="0"/>
-              <a:t>requirements </a:t>
-            </a:r>
-            <a:r>
-              <a:rPr lang="en-US" dirty="0" smtClean="0"/>
-              <a:t>completed</a:t>
-            </a:r>
-          </a:p>
-          <a:p>
-            <a:r>
-              <a:rPr lang="en-US" dirty="0" smtClean="0"/>
-              <a:t>4 of last 6 </a:t>
-            </a:r>
-            <a:r>
-              <a:rPr lang="en-US" dirty="0"/>
-              <a:t>requirements </a:t>
-            </a:r>
-            <a:r>
-              <a:rPr lang="en-US" dirty="0" smtClean="0"/>
-              <a:t>have started</a:t>
-            </a:r>
-          </a:p>
-          <a:p>
-            <a:r>
-              <a:rPr lang="en-US" dirty="0" smtClean="0"/>
-              <a:t>2 requirements not yet started</a:t>
-            </a:r>
-          </a:p>
-          <a:p>
-            <a:r>
-              <a:rPr lang="nl-NL" dirty="0" smtClean="0"/>
-              <a:t>Details </a:t>
-            </a:r>
-            <a:r>
-              <a:rPr lang="nl-NL" dirty="0"/>
-              <a:t>@ </a:t>
-            </a:r>
-            <a:r>
-              <a:rPr lang="nl-NL" dirty="0">
-                <a:hlinkClick r:id="rId3"/>
-              </a:rPr>
-              <a:t>http://goo.gl/</a:t>
-            </a:r>
-            <a:r>
-              <a:rPr lang="nl-NL" dirty="0" smtClean="0">
-                <a:hlinkClick r:id="rId3"/>
-              </a:rPr>
-              <a:t>ipJjU</a:t>
-            </a:r>
-            <a:r>
-              <a:rPr lang="nl-NL" dirty="0" smtClean="0"/>
-              <a:t> </a:t>
-            </a:r>
-            <a:endParaRPr lang="en-US" dirty="0"/>
-          </a:p>
-        </p:txBody>
-      </p:sp>
+        </p:nvPicPr>
+        <p:blipFill>
+          <a:blip r:embed="rId3">
+            <a:extLst>
+              <a:ext uri="{28A0092B-C50C-407E-A947-70E740481C1C}">
+                <a14:useLocalDpi xmlns:a14="http://schemas.microsoft.com/office/drawing/2010/main" val="0"/>
+              </a:ext>
+            </a:extLst>
+          </a:blip>
+          <a:srcRect t="13336" b="13336"/>
+          <a:stretch>
+            <a:fillRect/>
+          </a:stretch>
+        </p:blipFill>
+        <p:spPr>
+          <a:xfrm>
+            <a:off x="457200" y="1600201"/>
+            <a:ext cx="5542206" cy="3048000"/>
+          </a:xfrm>
+        </p:spPr>
+      </p:pic>
       <p:sp>
         <p:nvSpPr>
           <p:cNvPr id="4" name="Slide Number Placeholder 3"/>
@@ -9556,10 +9913,148 @@
           </a:p>
         </p:txBody>
       </p:sp>
+      <p:sp>
+        <p:nvSpPr>
+          <p:cNvPr id="6" name="TextBox 5"/>
+          <p:cNvSpPr txBox="1"/>
+          <p:nvPr/>
+        </p:nvSpPr>
+        <p:spPr>
+          <a:xfrm>
+            <a:off x="152400" y="5029200"/>
+            <a:ext cx="4343400" cy="369332"/>
+          </a:xfrm>
+          <a:prstGeom prst="rect">
+            <a:avLst/>
+          </a:prstGeom>
+          <a:noFill/>
+        </p:spPr>
+        <p:txBody>
+          <a:bodyPr wrap="square" rtlCol="0">
+            <a:spAutoFit/>
+          </a:bodyPr>
+          <a:lstStyle/>
+          <a:p>
+            <a:r>
+              <a:rPr lang="en-US" dirty="0" smtClean="0"/>
+              <a:t>Box where </a:t>
+            </a:r>
+            <a:r>
+              <a:rPr lang="en-US" dirty="0" err="1" smtClean="0"/>
+              <a:t>Arduino</a:t>
+            </a:r>
+            <a:r>
+              <a:rPr lang="en-US" dirty="0" smtClean="0"/>
+              <a:t> micro-controller will go</a:t>
+            </a:r>
+            <a:endParaRPr lang="en-US" dirty="0"/>
+          </a:p>
+        </p:txBody>
+      </p:sp>
+      <p:cxnSp>
+        <p:nvCxnSpPr>
+          <p:cNvPr id="8" name="Straight Arrow Connector 7"/>
+          <p:cNvCxnSpPr>
+            <a:stCxn id="6" idx="0"/>
+          </p:cNvCxnSpPr>
+          <p:nvPr/>
+        </p:nvCxnSpPr>
+        <p:spPr>
+          <a:xfrm flipV="1">
+            <a:off x="2324100" y="3200400"/>
+            <a:ext cx="723900" cy="1828800"/>
+          </a:xfrm>
+          <a:prstGeom prst="straightConnector1">
+            <a:avLst/>
+          </a:prstGeom>
+          <a:ln>
+            <a:tailEnd type="arrow"/>
+          </a:ln>
+        </p:spPr>
+        <p:style>
+          <a:lnRef idx="2">
+            <a:schemeClr val="accent1"/>
+          </a:lnRef>
+          <a:fillRef idx="0">
+            <a:schemeClr val="accent1"/>
+          </a:fillRef>
+          <a:effectRef idx="1">
+            <a:schemeClr val="accent1"/>
+          </a:effectRef>
+          <a:fontRef idx="minor">
+            <a:schemeClr val="tx1"/>
+          </a:fontRef>
+        </p:style>
+      </p:cxnSp>
+      <p:sp>
+        <p:nvSpPr>
+          <p:cNvPr id="11" name="TextBox 10"/>
+          <p:cNvSpPr txBox="1"/>
+          <p:nvPr/>
+        </p:nvSpPr>
+        <p:spPr>
+          <a:xfrm>
+            <a:off x="7239000" y="2819400"/>
+            <a:ext cx="1371600" cy="381000"/>
+          </a:xfrm>
+          <a:prstGeom prst="rect">
+            <a:avLst/>
+          </a:prstGeom>
+          <a:noFill/>
+        </p:spPr>
+        <p:txBody>
+          <a:bodyPr wrap="square" rtlCol="0">
+            <a:spAutoFit/>
+          </a:bodyPr>
+          <a:lstStyle/>
+          <a:p>
+            <a:r>
+              <a:rPr lang="en-US" dirty="0" smtClean="0"/>
+              <a:t>Connectors</a:t>
+            </a:r>
+            <a:endParaRPr lang="en-US" dirty="0"/>
+          </a:p>
+        </p:txBody>
+      </p:sp>
+      <p:cxnSp>
+        <p:nvCxnSpPr>
+          <p:cNvPr id="13" name="Straight Arrow Connector 12"/>
+          <p:cNvCxnSpPr>
+            <a:stCxn id="11" idx="2"/>
+          </p:cNvCxnSpPr>
+          <p:nvPr/>
+        </p:nvCxnSpPr>
+        <p:spPr>
+          <a:xfrm flipH="1">
+            <a:off x="7010400" y="3200400"/>
+            <a:ext cx="914400" cy="1752600"/>
+          </a:xfrm>
+          <a:prstGeom prst="straightConnector1">
+            <a:avLst/>
+          </a:prstGeom>
+          <a:ln>
+            <a:tailEnd type="arrow"/>
+          </a:ln>
+        </p:spPr>
+        <p:style>
+          <a:lnRef idx="2">
+            <a:schemeClr val="accent1"/>
+          </a:lnRef>
+          <a:fillRef idx="0">
+            <a:schemeClr val="accent1"/>
+          </a:fillRef>
+          <a:effectRef idx="1">
+            <a:schemeClr val="accent1"/>
+          </a:effectRef>
+          <a:fontRef idx="minor">
+            <a:schemeClr val="tx1"/>
+          </a:fontRef>
+        </p:style>
+      </p:cxnSp>
     </p:spTree>
     <p:extLst>
       <p:ext uri="{BB962C8B-B14F-4D97-AF65-F5344CB8AC3E}">
-        <p14:creationId xmlns:p14="http://schemas.microsoft.com/office/powerpoint/2010/main" val="2362761640"/>
+        <p14:creationId xmlns:p14="http://schemas.microsoft.com/office/powerpoint/2010/main" val="1445872560"/>
       </p:ext>
     </p:extLst>
   </p:cSld>

</xml_diff>